<commit_message>
guide chapters for sign on, accounts, departments, publish
</commit_message>
<xml_diff>
--- a/materials/figures.pptx
+++ b/materials/figures.pptx
@@ -6,6 +6,9 @@
   </p:sldMasterIdLst>
   <p:sldIdLst>
     <p:sldId id="256" r:id="rId2"/>
+    <p:sldId id="257" r:id="rId3"/>
+    <p:sldId id="258" r:id="rId4"/>
+    <p:sldId id="259" r:id="rId5"/>
   </p:sldIdLst>
   <p:sldSz cx="12192000" cy="6858000"/>
   <p:notesSz cx="6858000" cy="9144000"/>
@@ -104,6 +107,11 @@
       </a:defRPr>
     </a:lvl9pPr>
   </p:defaultTextStyle>
+  <p:extLst>
+    <p:ext uri="{EFAFB233-063F-42B5-8137-9DF3F51BA10A}">
+      <p15:sldGuideLst xmlns:p15="http://schemas.microsoft.com/office/powerpoint/2012/main"/>
+    </p:ext>
+  </p:extLst>
 </p:presentation>
 </file>
 
@@ -254,7 +262,7 @@
           <a:p>
             <a:fld id="{854B7659-5212-8440-8189-6E9F36EE2ADD}" type="datetimeFigureOut">
               <a:rPr lang="en-US" smtClean="0"/>
-              <a:t>1/9/25</a:t>
+              <a:t>2/4/25</a:t>
             </a:fld>
             <a:endParaRPr lang="en-US"/>
           </a:p>
@@ -452,7 +460,7 @@
           <a:p>
             <a:fld id="{854B7659-5212-8440-8189-6E9F36EE2ADD}" type="datetimeFigureOut">
               <a:rPr lang="en-US" smtClean="0"/>
-              <a:t>1/9/25</a:t>
+              <a:t>2/4/25</a:t>
             </a:fld>
             <a:endParaRPr lang="en-US"/>
           </a:p>
@@ -660,7 +668,7 @@
           <a:p>
             <a:fld id="{854B7659-5212-8440-8189-6E9F36EE2ADD}" type="datetimeFigureOut">
               <a:rPr lang="en-US" smtClean="0"/>
-              <a:t>1/9/25</a:t>
+              <a:t>2/4/25</a:t>
             </a:fld>
             <a:endParaRPr lang="en-US"/>
           </a:p>
@@ -858,7 +866,7 @@
           <a:p>
             <a:fld id="{854B7659-5212-8440-8189-6E9F36EE2ADD}" type="datetimeFigureOut">
               <a:rPr lang="en-US" smtClean="0"/>
-              <a:t>1/9/25</a:t>
+              <a:t>2/4/25</a:t>
             </a:fld>
             <a:endParaRPr lang="en-US"/>
           </a:p>
@@ -1133,7 +1141,7 @@
           <a:p>
             <a:fld id="{854B7659-5212-8440-8189-6E9F36EE2ADD}" type="datetimeFigureOut">
               <a:rPr lang="en-US" smtClean="0"/>
-              <a:t>1/9/25</a:t>
+              <a:t>2/4/25</a:t>
             </a:fld>
             <a:endParaRPr lang="en-US"/>
           </a:p>
@@ -1398,7 +1406,7 @@
           <a:p>
             <a:fld id="{854B7659-5212-8440-8189-6E9F36EE2ADD}" type="datetimeFigureOut">
               <a:rPr lang="en-US" smtClean="0"/>
-              <a:t>1/9/25</a:t>
+              <a:t>2/4/25</a:t>
             </a:fld>
             <a:endParaRPr lang="en-US"/>
           </a:p>
@@ -1810,7 +1818,7 @@
           <a:p>
             <a:fld id="{854B7659-5212-8440-8189-6E9F36EE2ADD}" type="datetimeFigureOut">
               <a:rPr lang="en-US" smtClean="0"/>
-              <a:t>1/9/25</a:t>
+              <a:t>2/4/25</a:t>
             </a:fld>
             <a:endParaRPr lang="en-US"/>
           </a:p>
@@ -1951,7 +1959,7 @@
           <a:p>
             <a:fld id="{854B7659-5212-8440-8189-6E9F36EE2ADD}" type="datetimeFigureOut">
               <a:rPr lang="en-US" smtClean="0"/>
-              <a:t>1/9/25</a:t>
+              <a:t>2/4/25</a:t>
             </a:fld>
             <a:endParaRPr lang="en-US"/>
           </a:p>
@@ -2064,7 +2072,7 @@
           <a:p>
             <a:fld id="{854B7659-5212-8440-8189-6E9F36EE2ADD}" type="datetimeFigureOut">
               <a:rPr lang="en-US" smtClean="0"/>
-              <a:t>1/9/25</a:t>
+              <a:t>2/4/25</a:t>
             </a:fld>
             <a:endParaRPr lang="en-US"/>
           </a:p>
@@ -2375,7 +2383,7 @@
           <a:p>
             <a:fld id="{854B7659-5212-8440-8189-6E9F36EE2ADD}" type="datetimeFigureOut">
               <a:rPr lang="en-US" smtClean="0"/>
-              <a:t>1/9/25</a:t>
+              <a:t>2/4/25</a:t>
             </a:fld>
             <a:endParaRPr lang="en-US"/>
           </a:p>
@@ -2663,7 +2671,7 @@
           <a:p>
             <a:fld id="{854B7659-5212-8440-8189-6E9F36EE2ADD}" type="datetimeFigureOut">
               <a:rPr lang="en-US" smtClean="0"/>
-              <a:t>1/9/25</a:t>
+              <a:t>2/4/25</a:t>
             </a:fld>
             <a:endParaRPr lang="en-US"/>
           </a:p>
@@ -2904,7 +2912,7 @@
           <a:p>
             <a:fld id="{854B7659-5212-8440-8189-6E9F36EE2ADD}" type="datetimeFigureOut">
               <a:rPr lang="en-US" smtClean="0"/>
-              <a:t>1/9/25</a:t>
+              <a:t>2/4/25</a:t>
             </a:fld>
             <a:endParaRPr lang="en-US"/>
           </a:p>
@@ -4461,6 +4469,1623 @@
     <p:extLst>
       <p:ext uri="{BB962C8B-B14F-4D97-AF65-F5344CB8AC3E}">
         <p14:creationId xmlns:p14="http://schemas.microsoft.com/office/powerpoint/2010/main" val="3426797087"/>
+      </p:ext>
+    </p:extLst>
+  </p:cSld>
+  <p:clrMapOvr>
+    <a:masterClrMapping/>
+  </p:clrMapOvr>
+</p:sld>
+</file>
+
+<file path=ppt/slides/slide2.xml><?xml version="1.0" encoding="utf-8"?>
+<p:sld xmlns:a="http://schemas.openxmlformats.org/drawingml/2006/main" xmlns:r="http://schemas.openxmlformats.org/officeDocument/2006/relationships" xmlns:p="http://schemas.openxmlformats.org/presentationml/2006/main">
+  <p:cSld>
+    <p:spTree>
+      <p:nvGrpSpPr>
+        <p:cNvPr id="1" name=""/>
+        <p:cNvGrpSpPr/>
+        <p:nvPr/>
+      </p:nvGrpSpPr>
+      <p:grpSpPr>
+        <a:xfrm>
+          <a:off x="0" y="0"/>
+          <a:ext cx="0" cy="0"/>
+          <a:chOff x="0" y="0"/>
+          <a:chExt cx="0" cy="0"/>
+        </a:xfrm>
+      </p:grpSpPr>
+      <p:sp>
+        <p:nvSpPr>
+          <p:cNvPr id="4" name="Rounded Rectangle 3">
+            <a:extLst>
+              <a:ext uri="{FF2B5EF4-FFF2-40B4-BE49-F238E27FC236}">
+                <a16:creationId xmlns:a16="http://schemas.microsoft.com/office/drawing/2014/main" id="{0273BD3F-000D-B7AA-408A-B4456593D258}"/>
+              </a:ext>
+            </a:extLst>
+          </p:cNvPr>
+          <p:cNvSpPr/>
+          <p:nvPr/>
+        </p:nvSpPr>
+        <p:spPr>
+          <a:xfrm>
+            <a:off x="1904780" y="225655"/>
+            <a:ext cx="1966003" cy="1210962"/>
+          </a:xfrm>
+          <a:prstGeom prst="roundRect">
+            <a:avLst/>
+          </a:prstGeom>
+          <a:solidFill>
+            <a:schemeClr val="accent6">
+              <a:lumMod val="60000"/>
+              <a:lumOff val="40000"/>
+            </a:schemeClr>
+          </a:solidFill>
+        </p:spPr>
+        <p:style>
+          <a:lnRef idx="2">
+            <a:schemeClr val="accent1">
+              <a:shade val="15000"/>
+            </a:schemeClr>
+          </a:lnRef>
+          <a:fillRef idx="1">
+            <a:schemeClr val="accent1"/>
+          </a:fillRef>
+          <a:effectRef idx="0">
+            <a:schemeClr val="accent1"/>
+          </a:effectRef>
+          <a:fontRef idx="minor">
+            <a:schemeClr val="lt1"/>
+          </a:fontRef>
+        </p:style>
+        <p:txBody>
+          <a:bodyPr rtlCol="0" anchor="ctr"/>
+          <a:lstStyle/>
+          <a:p>
+            <a:pPr algn="ctr"/>
+            <a:r>
+              <a:rPr lang="en-US" dirty="0">
+                <a:solidFill>
+                  <a:schemeClr val="tx1"/>
+                </a:solidFill>
+                <a:latin typeface="Consolas" panose="020B0609020204030204" pitchFamily="49" charset="0"/>
+                <a:cs typeface="Consolas" panose="020B0609020204030204" pitchFamily="49" charset="0"/>
+              </a:rPr>
+              <a:t>Role</a:t>
+            </a:r>
+          </a:p>
+        </p:txBody>
+      </p:sp>
+      <p:sp>
+        <p:nvSpPr>
+          <p:cNvPr id="5" name="Rounded Rectangle 4">
+            <a:extLst>
+              <a:ext uri="{FF2B5EF4-FFF2-40B4-BE49-F238E27FC236}">
+                <a16:creationId xmlns:a16="http://schemas.microsoft.com/office/drawing/2014/main" id="{C3478BBE-5E25-6AA9-89D6-EE37A1C64007}"/>
+              </a:ext>
+            </a:extLst>
+          </p:cNvPr>
+          <p:cNvSpPr/>
+          <p:nvPr/>
+        </p:nvSpPr>
+        <p:spPr>
+          <a:xfrm>
+            <a:off x="1904780" y="2968831"/>
+            <a:ext cx="1966003" cy="1210962"/>
+          </a:xfrm>
+          <a:prstGeom prst="roundRect">
+            <a:avLst/>
+          </a:prstGeom>
+          <a:solidFill>
+            <a:srgbClr val="940000">
+              <a:alpha val="70588"/>
+            </a:srgbClr>
+          </a:solidFill>
+        </p:spPr>
+        <p:style>
+          <a:lnRef idx="2">
+            <a:schemeClr val="accent1">
+              <a:shade val="15000"/>
+            </a:schemeClr>
+          </a:lnRef>
+          <a:fillRef idx="1">
+            <a:schemeClr val="accent1"/>
+          </a:fillRef>
+          <a:effectRef idx="0">
+            <a:schemeClr val="accent1"/>
+          </a:effectRef>
+          <a:fontRef idx="minor">
+            <a:schemeClr val="lt1"/>
+          </a:fontRef>
+        </p:style>
+        <p:txBody>
+          <a:bodyPr rtlCol="0" anchor="ctr"/>
+          <a:lstStyle/>
+          <a:p>
+            <a:pPr algn="ctr"/>
+            <a:r>
+              <a:rPr lang="en-US" dirty="0">
+                <a:solidFill>
+                  <a:schemeClr val="tx1"/>
+                </a:solidFill>
+                <a:latin typeface="Consolas" panose="020B0609020204030204" pitchFamily="49" charset="0"/>
+                <a:cs typeface="Consolas" panose="020B0609020204030204" pitchFamily="49" charset="0"/>
+              </a:rPr>
+              <a:t>Department</a:t>
+            </a:r>
+          </a:p>
+        </p:txBody>
+      </p:sp>
+      <p:sp>
+        <p:nvSpPr>
+          <p:cNvPr id="6" name="Rounded Rectangle 5">
+            <a:extLst>
+              <a:ext uri="{FF2B5EF4-FFF2-40B4-BE49-F238E27FC236}">
+                <a16:creationId xmlns:a16="http://schemas.microsoft.com/office/drawing/2014/main" id="{9E462285-299A-3911-602F-3B549F971DE3}"/>
+              </a:ext>
+            </a:extLst>
+          </p:cNvPr>
+          <p:cNvSpPr/>
+          <p:nvPr/>
+        </p:nvSpPr>
+        <p:spPr>
+          <a:xfrm>
+            <a:off x="8858863" y="3218212"/>
+            <a:ext cx="1966003" cy="1210962"/>
+          </a:xfrm>
+          <a:prstGeom prst="roundRect">
+            <a:avLst/>
+          </a:prstGeom>
+          <a:solidFill>
+            <a:schemeClr val="bg1">
+              <a:lumMod val="85000"/>
+            </a:schemeClr>
+          </a:solidFill>
+          <a:ln>
+            <a:solidFill>
+              <a:schemeClr val="bg1">
+                <a:lumMod val="50000"/>
+              </a:schemeClr>
+            </a:solidFill>
+          </a:ln>
+        </p:spPr>
+        <p:style>
+          <a:lnRef idx="2">
+            <a:schemeClr val="accent1">
+              <a:shade val="15000"/>
+            </a:schemeClr>
+          </a:lnRef>
+          <a:fillRef idx="1">
+            <a:schemeClr val="accent1"/>
+          </a:fillRef>
+          <a:effectRef idx="0">
+            <a:schemeClr val="accent1"/>
+          </a:effectRef>
+          <a:fontRef idx="minor">
+            <a:schemeClr val="lt1"/>
+          </a:fontRef>
+        </p:style>
+        <p:txBody>
+          <a:bodyPr rtlCol="0" anchor="ctr"/>
+          <a:lstStyle/>
+          <a:p>
+            <a:pPr algn="ctr"/>
+            <a:r>
+              <a:rPr lang="en-US" dirty="0">
+                <a:solidFill>
+                  <a:schemeClr val="bg1">
+                    <a:lumMod val="65000"/>
+                  </a:schemeClr>
+                </a:solidFill>
+                <a:latin typeface="Consolas" panose="020B0609020204030204" pitchFamily="49" charset="0"/>
+                <a:cs typeface="Consolas" panose="020B0609020204030204" pitchFamily="49" charset="0"/>
+              </a:rPr>
+              <a:t>Assignment</a:t>
+            </a:r>
+          </a:p>
+        </p:txBody>
+      </p:sp>
+      <p:sp>
+        <p:nvSpPr>
+          <p:cNvPr id="7" name="Rounded Rectangle 6">
+            <a:extLst>
+              <a:ext uri="{FF2B5EF4-FFF2-40B4-BE49-F238E27FC236}">
+                <a16:creationId xmlns:a16="http://schemas.microsoft.com/office/drawing/2014/main" id="{C40D2637-B12A-2E73-D395-E577FAEA1166}"/>
+              </a:ext>
+            </a:extLst>
+          </p:cNvPr>
+          <p:cNvSpPr/>
+          <p:nvPr/>
+        </p:nvSpPr>
+        <p:spPr>
+          <a:xfrm>
+            <a:off x="5569398" y="4696552"/>
+            <a:ext cx="1966003" cy="1210962"/>
+          </a:xfrm>
+          <a:prstGeom prst="roundRect">
+            <a:avLst/>
+          </a:prstGeom>
+          <a:solidFill>
+            <a:schemeClr val="bg1">
+              <a:lumMod val="85000"/>
+            </a:schemeClr>
+          </a:solidFill>
+          <a:ln>
+            <a:solidFill>
+              <a:schemeClr val="bg1">
+                <a:lumMod val="50000"/>
+              </a:schemeClr>
+            </a:solidFill>
+          </a:ln>
+        </p:spPr>
+        <p:style>
+          <a:lnRef idx="2">
+            <a:schemeClr val="dk1"/>
+          </a:lnRef>
+          <a:fillRef idx="1">
+            <a:schemeClr val="lt1"/>
+          </a:fillRef>
+          <a:effectRef idx="0">
+            <a:schemeClr val="dk1"/>
+          </a:effectRef>
+          <a:fontRef idx="minor">
+            <a:schemeClr val="dk1"/>
+          </a:fontRef>
+        </p:style>
+        <p:txBody>
+          <a:bodyPr rtlCol="0" anchor="ctr"/>
+          <a:lstStyle/>
+          <a:p>
+            <a:pPr algn="ctr"/>
+            <a:r>
+              <a:rPr lang="en-US" dirty="0">
+                <a:solidFill>
+                  <a:schemeClr val="bg1">
+                    <a:lumMod val="65000"/>
+                  </a:schemeClr>
+                </a:solidFill>
+                <a:latin typeface="Consolas" panose="020B0609020204030204" pitchFamily="49" charset="0"/>
+                <a:cs typeface="Consolas" panose="020B0609020204030204" pitchFamily="49" charset="0"/>
+              </a:rPr>
+              <a:t>Person</a:t>
+            </a:r>
+          </a:p>
+        </p:txBody>
+      </p:sp>
+      <p:sp>
+        <p:nvSpPr>
+          <p:cNvPr id="8" name="Rounded Rectangle 7">
+            <a:extLst>
+              <a:ext uri="{FF2B5EF4-FFF2-40B4-BE49-F238E27FC236}">
+                <a16:creationId xmlns:a16="http://schemas.microsoft.com/office/drawing/2014/main" id="{DE2CCF51-AE68-CFFC-4B2F-7244CDD6B5E5}"/>
+              </a:ext>
+            </a:extLst>
+          </p:cNvPr>
+          <p:cNvSpPr/>
+          <p:nvPr/>
+        </p:nvSpPr>
+        <p:spPr>
+          <a:xfrm>
+            <a:off x="5569398" y="1739873"/>
+            <a:ext cx="1966003" cy="1210962"/>
+          </a:xfrm>
+          <a:prstGeom prst="roundRect">
+            <a:avLst/>
+          </a:prstGeom>
+          <a:solidFill>
+            <a:schemeClr val="accent2">
+              <a:lumMod val="40000"/>
+              <a:lumOff val="60000"/>
+            </a:schemeClr>
+          </a:solidFill>
+        </p:spPr>
+        <p:style>
+          <a:lnRef idx="2">
+            <a:schemeClr val="accent1">
+              <a:shade val="15000"/>
+            </a:schemeClr>
+          </a:lnRef>
+          <a:fillRef idx="1">
+            <a:schemeClr val="accent1"/>
+          </a:fillRef>
+          <a:effectRef idx="0">
+            <a:schemeClr val="accent1"/>
+          </a:effectRef>
+          <a:fontRef idx="minor">
+            <a:schemeClr val="lt1"/>
+          </a:fontRef>
+        </p:style>
+        <p:txBody>
+          <a:bodyPr rtlCol="0" anchor="ctr"/>
+          <a:lstStyle/>
+          <a:p>
+            <a:pPr algn="ctr"/>
+            <a:r>
+              <a:rPr lang="en-US" dirty="0">
+                <a:solidFill>
+                  <a:schemeClr val="tx1"/>
+                </a:solidFill>
+                <a:latin typeface="Consolas" panose="020B0609020204030204" pitchFamily="49" charset="0"/>
+                <a:cs typeface="Consolas" panose="020B0609020204030204" pitchFamily="49" charset="0"/>
+              </a:rPr>
+              <a:t>Position</a:t>
+            </a:r>
+          </a:p>
+        </p:txBody>
+      </p:sp>
+      <p:sp>
+        <p:nvSpPr>
+          <p:cNvPr id="10" name="Cross 9">
+            <a:extLst>
+              <a:ext uri="{FF2B5EF4-FFF2-40B4-BE49-F238E27FC236}">
+                <a16:creationId xmlns:a16="http://schemas.microsoft.com/office/drawing/2014/main" id="{6A6FB89C-2D25-ED7D-06E1-71ADF8788C62}"/>
+              </a:ext>
+            </a:extLst>
+          </p:cNvPr>
+          <p:cNvSpPr/>
+          <p:nvPr/>
+        </p:nvSpPr>
+        <p:spPr>
+          <a:xfrm>
+            <a:off x="2624447" y="2030681"/>
+            <a:ext cx="486888" cy="498763"/>
+          </a:xfrm>
+          <a:prstGeom prst="plus">
+            <a:avLst>
+              <a:gd name="adj" fmla="val 39634"/>
+            </a:avLst>
+          </a:prstGeom>
+        </p:spPr>
+        <p:style>
+          <a:lnRef idx="2">
+            <a:schemeClr val="dk1">
+              <a:shade val="15000"/>
+            </a:schemeClr>
+          </a:lnRef>
+          <a:fillRef idx="1">
+            <a:schemeClr val="dk1"/>
+          </a:fillRef>
+          <a:effectRef idx="0">
+            <a:schemeClr val="dk1"/>
+          </a:effectRef>
+          <a:fontRef idx="minor">
+            <a:schemeClr val="lt1"/>
+          </a:fontRef>
+        </p:style>
+        <p:txBody>
+          <a:bodyPr rtlCol="0" anchor="ctr"/>
+          <a:lstStyle/>
+          <a:p>
+            <a:pPr algn="ctr"/>
+            <a:endParaRPr lang="en-US"/>
+          </a:p>
+        </p:txBody>
+      </p:sp>
+      <p:sp>
+        <p:nvSpPr>
+          <p:cNvPr id="11" name="Right Arrow 10">
+            <a:extLst>
+              <a:ext uri="{FF2B5EF4-FFF2-40B4-BE49-F238E27FC236}">
+                <a16:creationId xmlns:a16="http://schemas.microsoft.com/office/drawing/2014/main" id="{B7AC540F-371E-3264-3604-BC0D2EB6AB35}"/>
+              </a:ext>
+            </a:extLst>
+          </p:cNvPr>
+          <p:cNvSpPr/>
+          <p:nvPr/>
+        </p:nvSpPr>
+        <p:spPr>
+          <a:xfrm>
+            <a:off x="4459341" y="2173184"/>
+            <a:ext cx="724967" cy="356260"/>
+          </a:xfrm>
+          <a:prstGeom prst="rightArrow">
+            <a:avLst/>
+          </a:prstGeom>
+        </p:spPr>
+        <p:style>
+          <a:lnRef idx="2">
+            <a:schemeClr val="dk1">
+              <a:shade val="15000"/>
+            </a:schemeClr>
+          </a:lnRef>
+          <a:fillRef idx="1">
+            <a:schemeClr val="dk1"/>
+          </a:fillRef>
+          <a:effectRef idx="0">
+            <a:schemeClr val="dk1"/>
+          </a:effectRef>
+          <a:fontRef idx="minor">
+            <a:schemeClr val="lt1"/>
+          </a:fontRef>
+        </p:style>
+        <p:txBody>
+          <a:bodyPr rtlCol="0" anchor="ctr"/>
+          <a:lstStyle/>
+          <a:p>
+            <a:pPr algn="ctr"/>
+            <a:endParaRPr lang="en-US"/>
+          </a:p>
+        </p:txBody>
+      </p:sp>
+      <p:sp>
+        <p:nvSpPr>
+          <p:cNvPr id="12" name="Cross 11">
+            <a:extLst>
+              <a:ext uri="{FF2B5EF4-FFF2-40B4-BE49-F238E27FC236}">
+                <a16:creationId xmlns:a16="http://schemas.microsoft.com/office/drawing/2014/main" id="{92A691D4-A415-87BE-D5B6-7DBC3683F791}"/>
+              </a:ext>
+            </a:extLst>
+          </p:cNvPr>
+          <p:cNvSpPr/>
+          <p:nvPr/>
+        </p:nvSpPr>
+        <p:spPr>
+          <a:xfrm>
+            <a:off x="6308955" y="3574312"/>
+            <a:ext cx="486888" cy="498763"/>
+          </a:xfrm>
+          <a:prstGeom prst="plus">
+            <a:avLst>
+              <a:gd name="adj" fmla="val 39634"/>
+            </a:avLst>
+          </a:prstGeom>
+          <a:solidFill>
+            <a:schemeClr val="bg1">
+              <a:lumMod val="85000"/>
+            </a:schemeClr>
+          </a:solidFill>
+          <a:ln>
+            <a:solidFill>
+              <a:schemeClr val="bg1">
+                <a:lumMod val="50000"/>
+              </a:schemeClr>
+            </a:solidFill>
+          </a:ln>
+        </p:spPr>
+        <p:style>
+          <a:lnRef idx="2">
+            <a:schemeClr val="dk1">
+              <a:shade val="15000"/>
+            </a:schemeClr>
+          </a:lnRef>
+          <a:fillRef idx="1">
+            <a:schemeClr val="dk1"/>
+          </a:fillRef>
+          <a:effectRef idx="0">
+            <a:schemeClr val="dk1"/>
+          </a:effectRef>
+          <a:fontRef idx="minor">
+            <a:schemeClr val="lt1"/>
+          </a:fontRef>
+        </p:style>
+        <p:txBody>
+          <a:bodyPr rtlCol="0" anchor="ctr"/>
+          <a:lstStyle/>
+          <a:p>
+            <a:pPr algn="ctr"/>
+            <a:endParaRPr lang="en-US">
+              <a:solidFill>
+                <a:schemeClr val="bg1">
+                  <a:lumMod val="65000"/>
+                </a:schemeClr>
+              </a:solidFill>
+            </a:endParaRPr>
+          </a:p>
+        </p:txBody>
+      </p:sp>
+      <p:sp>
+        <p:nvSpPr>
+          <p:cNvPr id="13" name="Right Arrow 12">
+            <a:extLst>
+              <a:ext uri="{FF2B5EF4-FFF2-40B4-BE49-F238E27FC236}">
+                <a16:creationId xmlns:a16="http://schemas.microsoft.com/office/drawing/2014/main" id="{49D4BD3F-F480-5AF5-2D84-ABAC0A716AC5}"/>
+              </a:ext>
+            </a:extLst>
+          </p:cNvPr>
+          <p:cNvSpPr/>
+          <p:nvPr/>
+        </p:nvSpPr>
+        <p:spPr>
+          <a:xfrm>
+            <a:off x="7680852" y="3645563"/>
+            <a:ext cx="724967" cy="356260"/>
+          </a:xfrm>
+          <a:prstGeom prst="rightArrow">
+            <a:avLst/>
+          </a:prstGeom>
+          <a:solidFill>
+            <a:schemeClr val="bg1">
+              <a:lumMod val="85000"/>
+            </a:schemeClr>
+          </a:solidFill>
+          <a:ln>
+            <a:solidFill>
+              <a:schemeClr val="bg1">
+                <a:lumMod val="50000"/>
+              </a:schemeClr>
+            </a:solidFill>
+          </a:ln>
+        </p:spPr>
+        <p:style>
+          <a:lnRef idx="2">
+            <a:schemeClr val="dk1">
+              <a:shade val="15000"/>
+            </a:schemeClr>
+          </a:lnRef>
+          <a:fillRef idx="1">
+            <a:schemeClr val="dk1"/>
+          </a:fillRef>
+          <a:effectRef idx="0">
+            <a:schemeClr val="dk1"/>
+          </a:effectRef>
+          <a:fontRef idx="minor">
+            <a:schemeClr val="lt1"/>
+          </a:fontRef>
+        </p:style>
+        <p:txBody>
+          <a:bodyPr rtlCol="0" anchor="ctr"/>
+          <a:lstStyle/>
+          <a:p>
+            <a:pPr algn="ctr"/>
+            <a:endParaRPr lang="en-US">
+              <a:solidFill>
+                <a:schemeClr val="bg1">
+                  <a:lumMod val="65000"/>
+                </a:schemeClr>
+              </a:solidFill>
+            </a:endParaRPr>
+          </a:p>
+        </p:txBody>
+      </p:sp>
+      <p:sp>
+        <p:nvSpPr>
+          <p:cNvPr id="14" name="Rectangle 13">
+            <a:extLst>
+              <a:ext uri="{FF2B5EF4-FFF2-40B4-BE49-F238E27FC236}">
+                <a16:creationId xmlns:a16="http://schemas.microsoft.com/office/drawing/2014/main" id="{970A7326-66A4-9CD2-85C7-11D8BAAF9F72}"/>
+              </a:ext>
+            </a:extLst>
+          </p:cNvPr>
+          <p:cNvSpPr/>
+          <p:nvPr/>
+        </p:nvSpPr>
+        <p:spPr>
+          <a:xfrm>
+            <a:off x="1650670" y="106878"/>
+            <a:ext cx="6030182" cy="4322296"/>
+          </a:xfrm>
+          <a:prstGeom prst="rect">
+            <a:avLst/>
+          </a:prstGeom>
+          <a:noFill/>
+          <a:ln>
+            <a:solidFill>
+              <a:schemeClr val="tx1">
+                <a:lumMod val="75000"/>
+                <a:lumOff val="25000"/>
+              </a:schemeClr>
+            </a:solidFill>
+            <a:prstDash val="dash"/>
+          </a:ln>
+        </p:spPr>
+        <p:style>
+          <a:lnRef idx="2">
+            <a:schemeClr val="accent1">
+              <a:shade val="15000"/>
+            </a:schemeClr>
+          </a:lnRef>
+          <a:fillRef idx="1">
+            <a:schemeClr val="accent1"/>
+          </a:fillRef>
+          <a:effectRef idx="0">
+            <a:schemeClr val="accent1"/>
+          </a:effectRef>
+          <a:fontRef idx="minor">
+            <a:schemeClr val="lt1"/>
+          </a:fontRef>
+        </p:style>
+        <p:txBody>
+          <a:bodyPr rtlCol="0" anchor="ctr"/>
+          <a:lstStyle/>
+          <a:p>
+            <a:pPr algn="ctr"/>
+            <a:endParaRPr lang="en-US"/>
+          </a:p>
+        </p:txBody>
+      </p:sp>
+    </p:spTree>
+    <p:extLst>
+      <p:ext uri="{BB962C8B-B14F-4D97-AF65-F5344CB8AC3E}">
+        <p14:creationId xmlns:p14="http://schemas.microsoft.com/office/powerpoint/2010/main" val="1844233243"/>
+      </p:ext>
+    </p:extLst>
+  </p:cSld>
+  <p:clrMapOvr>
+    <a:masterClrMapping/>
+  </p:clrMapOvr>
+</p:sld>
+</file>
+
+<file path=ppt/slides/slide3.xml><?xml version="1.0" encoding="utf-8"?>
+<p:sld xmlns:a="http://schemas.openxmlformats.org/drawingml/2006/main" xmlns:r="http://schemas.openxmlformats.org/officeDocument/2006/relationships" xmlns:p="http://schemas.openxmlformats.org/presentationml/2006/main">
+  <p:cSld>
+    <p:spTree>
+      <p:nvGrpSpPr>
+        <p:cNvPr id="1" name="">
+          <a:extLst>
+            <a:ext uri="{FF2B5EF4-FFF2-40B4-BE49-F238E27FC236}">
+              <a16:creationId xmlns:a16="http://schemas.microsoft.com/office/drawing/2014/main" id="{D88FFB10-30E9-9163-1DC9-6DE75FFF8288}"/>
+            </a:ext>
+          </a:extLst>
+        </p:cNvPr>
+        <p:cNvGrpSpPr/>
+        <p:nvPr/>
+      </p:nvGrpSpPr>
+      <p:grpSpPr>
+        <a:xfrm>
+          <a:off x="0" y="0"/>
+          <a:ext cx="0" cy="0"/>
+          <a:chOff x="0" y="0"/>
+          <a:chExt cx="0" cy="0"/>
+        </a:xfrm>
+      </p:grpSpPr>
+      <p:sp>
+        <p:nvSpPr>
+          <p:cNvPr id="4" name="Rounded Rectangle 3">
+            <a:extLst>
+              <a:ext uri="{FF2B5EF4-FFF2-40B4-BE49-F238E27FC236}">
+                <a16:creationId xmlns:a16="http://schemas.microsoft.com/office/drawing/2014/main" id="{A97CFD70-8BF5-B3B5-90D5-A01B9C296D6E}"/>
+              </a:ext>
+            </a:extLst>
+          </p:cNvPr>
+          <p:cNvSpPr/>
+          <p:nvPr/>
+        </p:nvSpPr>
+        <p:spPr>
+          <a:xfrm>
+            <a:off x="1904780" y="225655"/>
+            <a:ext cx="1966003" cy="1210962"/>
+          </a:xfrm>
+          <a:prstGeom prst="roundRect">
+            <a:avLst/>
+          </a:prstGeom>
+          <a:solidFill>
+            <a:schemeClr val="bg1">
+              <a:lumMod val="75000"/>
+            </a:schemeClr>
+          </a:solidFill>
+          <a:ln>
+            <a:solidFill>
+              <a:schemeClr val="bg1">
+                <a:lumMod val="50000"/>
+              </a:schemeClr>
+            </a:solidFill>
+          </a:ln>
+        </p:spPr>
+        <p:style>
+          <a:lnRef idx="2">
+            <a:schemeClr val="accent1">
+              <a:shade val="15000"/>
+            </a:schemeClr>
+          </a:lnRef>
+          <a:fillRef idx="1">
+            <a:schemeClr val="accent1"/>
+          </a:fillRef>
+          <a:effectRef idx="0">
+            <a:schemeClr val="accent1"/>
+          </a:effectRef>
+          <a:fontRef idx="minor">
+            <a:schemeClr val="lt1"/>
+          </a:fontRef>
+        </p:style>
+        <p:txBody>
+          <a:bodyPr rtlCol="0" anchor="ctr"/>
+          <a:lstStyle/>
+          <a:p>
+            <a:pPr algn="ctr"/>
+            <a:r>
+              <a:rPr lang="en-US" dirty="0">
+                <a:solidFill>
+                  <a:schemeClr val="bg1">
+                    <a:lumMod val="65000"/>
+                  </a:schemeClr>
+                </a:solidFill>
+                <a:latin typeface="Consolas" panose="020B0609020204030204" pitchFamily="49" charset="0"/>
+                <a:cs typeface="Consolas" panose="020B0609020204030204" pitchFamily="49" charset="0"/>
+              </a:rPr>
+              <a:t>Role</a:t>
+            </a:r>
+          </a:p>
+        </p:txBody>
+      </p:sp>
+      <p:sp>
+        <p:nvSpPr>
+          <p:cNvPr id="6" name="Rounded Rectangle 5">
+            <a:extLst>
+              <a:ext uri="{FF2B5EF4-FFF2-40B4-BE49-F238E27FC236}">
+                <a16:creationId xmlns:a16="http://schemas.microsoft.com/office/drawing/2014/main" id="{C9A09CDC-19D4-C65A-0C41-B908779A0BD8}"/>
+              </a:ext>
+            </a:extLst>
+          </p:cNvPr>
+          <p:cNvSpPr/>
+          <p:nvPr/>
+        </p:nvSpPr>
+        <p:spPr>
+          <a:xfrm>
+            <a:off x="8858863" y="3218212"/>
+            <a:ext cx="1966003" cy="1210962"/>
+          </a:xfrm>
+          <a:prstGeom prst="roundRect">
+            <a:avLst/>
+          </a:prstGeom>
+          <a:solidFill>
+            <a:schemeClr val="accent5">
+              <a:lumMod val="40000"/>
+              <a:lumOff val="60000"/>
+            </a:schemeClr>
+          </a:solidFill>
+        </p:spPr>
+        <p:style>
+          <a:lnRef idx="2">
+            <a:schemeClr val="accent1">
+              <a:shade val="15000"/>
+            </a:schemeClr>
+          </a:lnRef>
+          <a:fillRef idx="1">
+            <a:schemeClr val="accent1"/>
+          </a:fillRef>
+          <a:effectRef idx="0">
+            <a:schemeClr val="accent1"/>
+          </a:effectRef>
+          <a:fontRef idx="minor">
+            <a:schemeClr val="lt1"/>
+          </a:fontRef>
+        </p:style>
+        <p:txBody>
+          <a:bodyPr rtlCol="0" anchor="ctr"/>
+          <a:lstStyle/>
+          <a:p>
+            <a:pPr algn="ctr"/>
+            <a:r>
+              <a:rPr lang="en-US" dirty="0">
+                <a:solidFill>
+                  <a:schemeClr val="tx1"/>
+                </a:solidFill>
+                <a:latin typeface="Consolas" panose="020B0609020204030204" pitchFamily="49" charset="0"/>
+                <a:cs typeface="Consolas" panose="020B0609020204030204" pitchFamily="49" charset="0"/>
+              </a:rPr>
+              <a:t>Assignment</a:t>
+            </a:r>
+          </a:p>
+        </p:txBody>
+      </p:sp>
+      <p:sp>
+        <p:nvSpPr>
+          <p:cNvPr id="7" name="Rounded Rectangle 6">
+            <a:extLst>
+              <a:ext uri="{FF2B5EF4-FFF2-40B4-BE49-F238E27FC236}">
+                <a16:creationId xmlns:a16="http://schemas.microsoft.com/office/drawing/2014/main" id="{900D79BC-7A10-5827-746C-2738FE46983B}"/>
+              </a:ext>
+            </a:extLst>
+          </p:cNvPr>
+          <p:cNvSpPr/>
+          <p:nvPr/>
+        </p:nvSpPr>
+        <p:spPr>
+          <a:xfrm>
+            <a:off x="5569398" y="4696552"/>
+            <a:ext cx="1966003" cy="1210962"/>
+          </a:xfrm>
+          <a:prstGeom prst="roundRect">
+            <a:avLst/>
+          </a:prstGeom>
+          <a:solidFill>
+            <a:schemeClr val="accent4">
+              <a:lumMod val="40000"/>
+              <a:lumOff val="60000"/>
+            </a:schemeClr>
+          </a:solidFill>
+        </p:spPr>
+        <p:style>
+          <a:lnRef idx="2">
+            <a:schemeClr val="dk1"/>
+          </a:lnRef>
+          <a:fillRef idx="1">
+            <a:schemeClr val="lt1"/>
+          </a:fillRef>
+          <a:effectRef idx="0">
+            <a:schemeClr val="dk1"/>
+          </a:effectRef>
+          <a:fontRef idx="minor">
+            <a:schemeClr val="dk1"/>
+          </a:fontRef>
+        </p:style>
+        <p:txBody>
+          <a:bodyPr rtlCol="0" anchor="ctr"/>
+          <a:lstStyle/>
+          <a:p>
+            <a:pPr algn="ctr"/>
+            <a:r>
+              <a:rPr lang="en-US" dirty="0">
+                <a:solidFill>
+                  <a:schemeClr val="tx1"/>
+                </a:solidFill>
+                <a:latin typeface="Consolas" panose="020B0609020204030204" pitchFamily="49" charset="0"/>
+                <a:cs typeface="Consolas" panose="020B0609020204030204" pitchFamily="49" charset="0"/>
+              </a:rPr>
+              <a:t>Person</a:t>
+            </a:r>
+          </a:p>
+        </p:txBody>
+      </p:sp>
+      <p:sp>
+        <p:nvSpPr>
+          <p:cNvPr id="8" name="Rounded Rectangle 7">
+            <a:extLst>
+              <a:ext uri="{FF2B5EF4-FFF2-40B4-BE49-F238E27FC236}">
+                <a16:creationId xmlns:a16="http://schemas.microsoft.com/office/drawing/2014/main" id="{6D8C9B0B-52B3-816D-E8D7-3CCCDDB443AF}"/>
+              </a:ext>
+            </a:extLst>
+          </p:cNvPr>
+          <p:cNvSpPr/>
+          <p:nvPr/>
+        </p:nvSpPr>
+        <p:spPr>
+          <a:xfrm>
+            <a:off x="5569398" y="1739873"/>
+            <a:ext cx="1966003" cy="1210962"/>
+          </a:xfrm>
+          <a:prstGeom prst="roundRect">
+            <a:avLst/>
+          </a:prstGeom>
+          <a:solidFill>
+            <a:schemeClr val="accent2">
+              <a:lumMod val="40000"/>
+              <a:lumOff val="60000"/>
+            </a:schemeClr>
+          </a:solidFill>
+        </p:spPr>
+        <p:style>
+          <a:lnRef idx="2">
+            <a:schemeClr val="accent1">
+              <a:shade val="15000"/>
+            </a:schemeClr>
+          </a:lnRef>
+          <a:fillRef idx="1">
+            <a:schemeClr val="accent1"/>
+          </a:fillRef>
+          <a:effectRef idx="0">
+            <a:schemeClr val="accent1"/>
+          </a:effectRef>
+          <a:fontRef idx="minor">
+            <a:schemeClr val="lt1"/>
+          </a:fontRef>
+        </p:style>
+        <p:txBody>
+          <a:bodyPr rtlCol="0" anchor="ctr"/>
+          <a:lstStyle/>
+          <a:p>
+            <a:pPr algn="ctr"/>
+            <a:r>
+              <a:rPr lang="en-US" dirty="0">
+                <a:solidFill>
+                  <a:schemeClr val="tx1"/>
+                </a:solidFill>
+                <a:latin typeface="Consolas" panose="020B0609020204030204" pitchFamily="49" charset="0"/>
+                <a:cs typeface="Consolas" panose="020B0609020204030204" pitchFamily="49" charset="0"/>
+              </a:rPr>
+              <a:t>Position</a:t>
+            </a:r>
+          </a:p>
+        </p:txBody>
+      </p:sp>
+      <p:sp>
+        <p:nvSpPr>
+          <p:cNvPr id="10" name="Cross 9">
+            <a:extLst>
+              <a:ext uri="{FF2B5EF4-FFF2-40B4-BE49-F238E27FC236}">
+                <a16:creationId xmlns:a16="http://schemas.microsoft.com/office/drawing/2014/main" id="{D01E3446-A956-8149-1289-D3A439678329}"/>
+              </a:ext>
+            </a:extLst>
+          </p:cNvPr>
+          <p:cNvSpPr/>
+          <p:nvPr/>
+        </p:nvSpPr>
+        <p:spPr>
+          <a:xfrm>
+            <a:off x="2624447" y="2030681"/>
+            <a:ext cx="486888" cy="498763"/>
+          </a:xfrm>
+          <a:prstGeom prst="plus">
+            <a:avLst>
+              <a:gd name="adj" fmla="val 39634"/>
+            </a:avLst>
+          </a:prstGeom>
+          <a:solidFill>
+            <a:schemeClr val="bg1">
+              <a:lumMod val="75000"/>
+            </a:schemeClr>
+          </a:solidFill>
+          <a:ln>
+            <a:solidFill>
+              <a:schemeClr val="bg1">
+                <a:lumMod val="50000"/>
+              </a:schemeClr>
+            </a:solidFill>
+          </a:ln>
+        </p:spPr>
+        <p:style>
+          <a:lnRef idx="2">
+            <a:schemeClr val="dk1">
+              <a:shade val="15000"/>
+            </a:schemeClr>
+          </a:lnRef>
+          <a:fillRef idx="1">
+            <a:schemeClr val="dk1"/>
+          </a:fillRef>
+          <a:effectRef idx="0">
+            <a:schemeClr val="dk1"/>
+          </a:effectRef>
+          <a:fontRef idx="minor">
+            <a:schemeClr val="lt1"/>
+          </a:fontRef>
+        </p:style>
+        <p:txBody>
+          <a:bodyPr rtlCol="0" anchor="ctr"/>
+          <a:lstStyle/>
+          <a:p>
+            <a:pPr algn="ctr"/>
+            <a:endParaRPr lang="en-US">
+              <a:solidFill>
+                <a:schemeClr val="bg1">
+                  <a:lumMod val="65000"/>
+                </a:schemeClr>
+              </a:solidFill>
+            </a:endParaRPr>
+          </a:p>
+        </p:txBody>
+      </p:sp>
+      <p:sp>
+        <p:nvSpPr>
+          <p:cNvPr id="11" name="Right Arrow 10">
+            <a:extLst>
+              <a:ext uri="{FF2B5EF4-FFF2-40B4-BE49-F238E27FC236}">
+                <a16:creationId xmlns:a16="http://schemas.microsoft.com/office/drawing/2014/main" id="{DEFF7FED-0F33-C448-953B-BC164B6E1073}"/>
+              </a:ext>
+            </a:extLst>
+          </p:cNvPr>
+          <p:cNvSpPr/>
+          <p:nvPr/>
+        </p:nvSpPr>
+        <p:spPr>
+          <a:xfrm>
+            <a:off x="4459341" y="2173184"/>
+            <a:ext cx="724967" cy="356260"/>
+          </a:xfrm>
+          <a:prstGeom prst="rightArrow">
+            <a:avLst/>
+          </a:prstGeom>
+          <a:solidFill>
+            <a:schemeClr val="bg1">
+              <a:lumMod val="75000"/>
+            </a:schemeClr>
+          </a:solidFill>
+          <a:ln>
+            <a:solidFill>
+              <a:schemeClr val="bg1">
+                <a:lumMod val="50000"/>
+              </a:schemeClr>
+            </a:solidFill>
+          </a:ln>
+        </p:spPr>
+        <p:style>
+          <a:lnRef idx="2">
+            <a:schemeClr val="dk1">
+              <a:shade val="15000"/>
+            </a:schemeClr>
+          </a:lnRef>
+          <a:fillRef idx="1">
+            <a:schemeClr val="dk1"/>
+          </a:fillRef>
+          <a:effectRef idx="0">
+            <a:schemeClr val="dk1"/>
+          </a:effectRef>
+          <a:fontRef idx="minor">
+            <a:schemeClr val="lt1"/>
+          </a:fontRef>
+        </p:style>
+        <p:txBody>
+          <a:bodyPr rtlCol="0" anchor="ctr"/>
+          <a:lstStyle/>
+          <a:p>
+            <a:pPr algn="ctr"/>
+            <a:endParaRPr lang="en-US">
+              <a:solidFill>
+                <a:schemeClr val="bg1">
+                  <a:lumMod val="65000"/>
+                </a:schemeClr>
+              </a:solidFill>
+            </a:endParaRPr>
+          </a:p>
+        </p:txBody>
+      </p:sp>
+      <p:sp>
+        <p:nvSpPr>
+          <p:cNvPr id="12" name="Cross 11">
+            <a:extLst>
+              <a:ext uri="{FF2B5EF4-FFF2-40B4-BE49-F238E27FC236}">
+                <a16:creationId xmlns:a16="http://schemas.microsoft.com/office/drawing/2014/main" id="{89B0BF57-DF1F-B329-42E2-F015AF8B3BD9}"/>
+              </a:ext>
+            </a:extLst>
+          </p:cNvPr>
+          <p:cNvSpPr/>
+          <p:nvPr/>
+        </p:nvSpPr>
+        <p:spPr>
+          <a:xfrm>
+            <a:off x="6308955" y="3574312"/>
+            <a:ext cx="486888" cy="498763"/>
+          </a:xfrm>
+          <a:prstGeom prst="plus">
+            <a:avLst>
+              <a:gd name="adj" fmla="val 39634"/>
+            </a:avLst>
+          </a:prstGeom>
+        </p:spPr>
+        <p:style>
+          <a:lnRef idx="2">
+            <a:schemeClr val="dk1">
+              <a:shade val="15000"/>
+            </a:schemeClr>
+          </a:lnRef>
+          <a:fillRef idx="1">
+            <a:schemeClr val="dk1"/>
+          </a:fillRef>
+          <a:effectRef idx="0">
+            <a:schemeClr val="dk1"/>
+          </a:effectRef>
+          <a:fontRef idx="minor">
+            <a:schemeClr val="lt1"/>
+          </a:fontRef>
+        </p:style>
+        <p:txBody>
+          <a:bodyPr rtlCol="0" anchor="ctr"/>
+          <a:lstStyle/>
+          <a:p>
+            <a:pPr algn="ctr"/>
+            <a:endParaRPr lang="en-US"/>
+          </a:p>
+        </p:txBody>
+      </p:sp>
+      <p:sp>
+        <p:nvSpPr>
+          <p:cNvPr id="13" name="Right Arrow 12">
+            <a:extLst>
+              <a:ext uri="{FF2B5EF4-FFF2-40B4-BE49-F238E27FC236}">
+                <a16:creationId xmlns:a16="http://schemas.microsoft.com/office/drawing/2014/main" id="{9313B22F-EC95-A85C-C66F-7614AFA0C069}"/>
+              </a:ext>
+            </a:extLst>
+          </p:cNvPr>
+          <p:cNvSpPr/>
+          <p:nvPr/>
+        </p:nvSpPr>
+        <p:spPr>
+          <a:xfrm>
+            <a:off x="7680852" y="3645563"/>
+            <a:ext cx="724967" cy="356260"/>
+          </a:xfrm>
+          <a:prstGeom prst="rightArrow">
+            <a:avLst/>
+          </a:prstGeom>
+        </p:spPr>
+        <p:style>
+          <a:lnRef idx="2">
+            <a:schemeClr val="dk1">
+              <a:shade val="15000"/>
+            </a:schemeClr>
+          </a:lnRef>
+          <a:fillRef idx="1">
+            <a:schemeClr val="dk1"/>
+          </a:fillRef>
+          <a:effectRef idx="0">
+            <a:schemeClr val="dk1"/>
+          </a:effectRef>
+          <a:fontRef idx="minor">
+            <a:schemeClr val="lt1"/>
+          </a:fontRef>
+        </p:style>
+        <p:txBody>
+          <a:bodyPr rtlCol="0" anchor="ctr"/>
+          <a:lstStyle/>
+          <a:p>
+            <a:pPr algn="ctr"/>
+            <a:endParaRPr lang="en-US"/>
+          </a:p>
+        </p:txBody>
+      </p:sp>
+      <p:sp>
+        <p:nvSpPr>
+          <p:cNvPr id="14" name="Rectangle 13">
+            <a:extLst>
+              <a:ext uri="{FF2B5EF4-FFF2-40B4-BE49-F238E27FC236}">
+                <a16:creationId xmlns:a16="http://schemas.microsoft.com/office/drawing/2014/main" id="{C19742B7-E8E3-2B60-B94A-EC6E3E0A05F9}"/>
+              </a:ext>
+            </a:extLst>
+          </p:cNvPr>
+          <p:cNvSpPr/>
+          <p:nvPr/>
+        </p:nvSpPr>
+        <p:spPr>
+          <a:xfrm>
+            <a:off x="5390728" y="1662545"/>
+            <a:ext cx="6030182" cy="4322296"/>
+          </a:xfrm>
+          <a:prstGeom prst="rect">
+            <a:avLst/>
+          </a:prstGeom>
+          <a:noFill/>
+          <a:ln>
+            <a:solidFill>
+              <a:schemeClr val="tx1">
+                <a:lumMod val="75000"/>
+                <a:lumOff val="25000"/>
+              </a:schemeClr>
+            </a:solidFill>
+            <a:prstDash val="dash"/>
+          </a:ln>
+        </p:spPr>
+        <p:style>
+          <a:lnRef idx="2">
+            <a:schemeClr val="accent1">
+              <a:shade val="15000"/>
+            </a:schemeClr>
+          </a:lnRef>
+          <a:fillRef idx="1">
+            <a:schemeClr val="accent1"/>
+          </a:fillRef>
+          <a:effectRef idx="0">
+            <a:schemeClr val="accent1"/>
+          </a:effectRef>
+          <a:fontRef idx="minor">
+            <a:schemeClr val="lt1"/>
+          </a:fontRef>
+        </p:style>
+        <p:txBody>
+          <a:bodyPr rtlCol="0" anchor="ctr"/>
+          <a:lstStyle/>
+          <a:p>
+            <a:pPr algn="ctr"/>
+            <a:endParaRPr lang="en-US"/>
+          </a:p>
+        </p:txBody>
+      </p:sp>
+      <p:sp>
+        <p:nvSpPr>
+          <p:cNvPr id="2" name="Rounded Rectangle 1">
+            <a:extLst>
+              <a:ext uri="{FF2B5EF4-FFF2-40B4-BE49-F238E27FC236}">
+                <a16:creationId xmlns:a16="http://schemas.microsoft.com/office/drawing/2014/main" id="{CBF9D55D-4BC1-7529-10F8-B606E11CC513}"/>
+              </a:ext>
+            </a:extLst>
+          </p:cNvPr>
+          <p:cNvSpPr/>
+          <p:nvPr/>
+        </p:nvSpPr>
+        <p:spPr>
+          <a:xfrm>
+            <a:off x="1904780" y="2968831"/>
+            <a:ext cx="1966003" cy="1210962"/>
+          </a:xfrm>
+          <a:prstGeom prst="roundRect">
+            <a:avLst/>
+          </a:prstGeom>
+          <a:solidFill>
+            <a:schemeClr val="bg1">
+              <a:lumMod val="75000"/>
+            </a:schemeClr>
+          </a:solidFill>
+          <a:ln>
+            <a:solidFill>
+              <a:schemeClr val="bg1">
+                <a:lumMod val="50000"/>
+              </a:schemeClr>
+            </a:solidFill>
+          </a:ln>
+        </p:spPr>
+        <p:style>
+          <a:lnRef idx="2">
+            <a:schemeClr val="accent1">
+              <a:shade val="15000"/>
+            </a:schemeClr>
+          </a:lnRef>
+          <a:fillRef idx="1">
+            <a:schemeClr val="accent1"/>
+          </a:fillRef>
+          <a:effectRef idx="0">
+            <a:schemeClr val="accent1"/>
+          </a:effectRef>
+          <a:fontRef idx="minor">
+            <a:schemeClr val="lt1"/>
+          </a:fontRef>
+        </p:style>
+        <p:txBody>
+          <a:bodyPr rtlCol="0" anchor="ctr"/>
+          <a:lstStyle/>
+          <a:p>
+            <a:pPr algn="ctr"/>
+            <a:r>
+              <a:rPr lang="en-US" dirty="0">
+                <a:solidFill>
+                  <a:schemeClr val="bg1">
+                    <a:lumMod val="65000"/>
+                  </a:schemeClr>
+                </a:solidFill>
+                <a:latin typeface="Consolas" panose="020B0609020204030204" pitchFamily="49" charset="0"/>
+                <a:cs typeface="Consolas" panose="020B0609020204030204" pitchFamily="49" charset="0"/>
+              </a:rPr>
+              <a:t>Department</a:t>
+            </a:r>
+          </a:p>
+        </p:txBody>
+      </p:sp>
+    </p:spTree>
+    <p:extLst>
+      <p:ext uri="{BB962C8B-B14F-4D97-AF65-F5344CB8AC3E}">
+        <p14:creationId xmlns:p14="http://schemas.microsoft.com/office/powerpoint/2010/main" val="928793910"/>
+      </p:ext>
+    </p:extLst>
+  </p:cSld>
+  <p:clrMapOvr>
+    <a:masterClrMapping/>
+  </p:clrMapOvr>
+</p:sld>
+</file>
+
+<file path=ppt/slides/slide4.xml><?xml version="1.0" encoding="utf-8"?>
+<p:sld xmlns:a="http://schemas.openxmlformats.org/drawingml/2006/main" xmlns:r="http://schemas.openxmlformats.org/officeDocument/2006/relationships" xmlns:p="http://schemas.openxmlformats.org/presentationml/2006/main">
+  <p:cSld>
+    <p:spTree>
+      <p:nvGrpSpPr>
+        <p:cNvPr id="1" name=""/>
+        <p:cNvGrpSpPr/>
+        <p:nvPr/>
+      </p:nvGrpSpPr>
+      <p:grpSpPr>
+        <a:xfrm>
+          <a:off x="0" y="0"/>
+          <a:ext cx="0" cy="0"/>
+          <a:chOff x="0" y="0"/>
+          <a:chExt cx="0" cy="0"/>
+        </a:xfrm>
+      </p:grpSpPr>
+      <p:sp>
+        <p:nvSpPr>
+          <p:cNvPr id="4" name="Rounded Rectangle 3">
+            <a:extLst>
+              <a:ext uri="{FF2B5EF4-FFF2-40B4-BE49-F238E27FC236}">
+                <a16:creationId xmlns:a16="http://schemas.microsoft.com/office/drawing/2014/main" id="{8A24E9FF-273F-8B49-88F8-079C6B458FEB}"/>
+              </a:ext>
+            </a:extLst>
+          </p:cNvPr>
+          <p:cNvSpPr/>
+          <p:nvPr/>
+        </p:nvSpPr>
+        <p:spPr>
+          <a:xfrm>
+            <a:off x="4900423" y="3429000"/>
+            <a:ext cx="1966003" cy="1210962"/>
+          </a:xfrm>
+          <a:prstGeom prst="roundRect">
+            <a:avLst/>
+          </a:prstGeom>
+          <a:solidFill>
+            <a:schemeClr val="accent5">
+              <a:lumMod val="40000"/>
+              <a:lumOff val="60000"/>
+            </a:schemeClr>
+          </a:solidFill>
+        </p:spPr>
+        <p:style>
+          <a:lnRef idx="2">
+            <a:schemeClr val="accent1">
+              <a:shade val="15000"/>
+            </a:schemeClr>
+          </a:lnRef>
+          <a:fillRef idx="1">
+            <a:schemeClr val="accent1"/>
+          </a:fillRef>
+          <a:effectRef idx="0">
+            <a:schemeClr val="accent1"/>
+          </a:effectRef>
+          <a:fontRef idx="minor">
+            <a:schemeClr val="lt1"/>
+          </a:fontRef>
+        </p:style>
+        <p:txBody>
+          <a:bodyPr rtlCol="0" anchor="ctr"/>
+          <a:lstStyle/>
+          <a:p>
+            <a:pPr algn="ctr"/>
+            <a:r>
+              <a:rPr lang="en-US" dirty="0">
+                <a:solidFill>
+                  <a:schemeClr val="tx1"/>
+                </a:solidFill>
+                <a:latin typeface="Consolas" panose="020B0609020204030204" pitchFamily="49" charset="0"/>
+                <a:cs typeface="Consolas" panose="020B0609020204030204" pitchFamily="49" charset="0"/>
+              </a:rPr>
+              <a:t>HIST 109</a:t>
+            </a:r>
+          </a:p>
+          <a:p>
+            <a:pPr algn="ctr"/>
+            <a:r>
+              <a:rPr lang="en-US" dirty="0">
+                <a:solidFill>
+                  <a:schemeClr val="tx1"/>
+                </a:solidFill>
+                <a:latin typeface="Consolas" panose="020B0609020204030204" pitchFamily="49" charset="0"/>
+                <a:cs typeface="Consolas" panose="020B0609020204030204" pitchFamily="49" charset="0"/>
+              </a:rPr>
+              <a:t>AY 2025</a:t>
+            </a:r>
+          </a:p>
+          <a:p>
+            <a:pPr algn="ctr"/>
+            <a:r>
+              <a:rPr lang="en-US" dirty="0">
+                <a:solidFill>
+                  <a:schemeClr val="tx1"/>
+                </a:solidFill>
+                <a:latin typeface="Consolas" panose="020B0609020204030204" pitchFamily="49" charset="0"/>
+                <a:cs typeface="Consolas" panose="020B0609020204030204" pitchFamily="49" charset="0"/>
+              </a:rPr>
+              <a:t>ID = 1482</a:t>
+            </a:r>
+          </a:p>
+        </p:txBody>
+      </p:sp>
+      <p:sp>
+        <p:nvSpPr>
+          <p:cNvPr id="5" name="Rounded Rectangle 4">
+            <a:extLst>
+              <a:ext uri="{FF2B5EF4-FFF2-40B4-BE49-F238E27FC236}">
+                <a16:creationId xmlns:a16="http://schemas.microsoft.com/office/drawing/2014/main" id="{C0D5E13A-677E-E2F4-46F7-A7E544D6B71B}"/>
+              </a:ext>
+            </a:extLst>
+          </p:cNvPr>
+          <p:cNvSpPr/>
+          <p:nvPr/>
+        </p:nvSpPr>
+        <p:spPr>
+          <a:xfrm>
+            <a:off x="1027923" y="3429000"/>
+            <a:ext cx="1966003" cy="1210962"/>
+          </a:xfrm>
+          <a:prstGeom prst="roundRect">
+            <a:avLst/>
+          </a:prstGeom>
+          <a:solidFill>
+            <a:schemeClr val="accent4">
+              <a:lumMod val="40000"/>
+              <a:lumOff val="60000"/>
+            </a:schemeClr>
+          </a:solidFill>
+        </p:spPr>
+        <p:style>
+          <a:lnRef idx="2">
+            <a:schemeClr val="dk1"/>
+          </a:lnRef>
+          <a:fillRef idx="1">
+            <a:schemeClr val="lt1"/>
+          </a:fillRef>
+          <a:effectRef idx="0">
+            <a:schemeClr val="dk1"/>
+          </a:effectRef>
+          <a:fontRef idx="minor">
+            <a:schemeClr val="dk1"/>
+          </a:fontRef>
+        </p:style>
+        <p:txBody>
+          <a:bodyPr rtlCol="0" anchor="ctr"/>
+          <a:lstStyle/>
+          <a:p>
+            <a:pPr algn="ctr"/>
+            <a:r>
+              <a:rPr lang="en-US" dirty="0">
+                <a:solidFill>
+                  <a:schemeClr val="tx1"/>
+                </a:solidFill>
+                <a:latin typeface="Consolas" panose="020B0609020204030204" pitchFamily="49" charset="0"/>
+                <a:cs typeface="Consolas" panose="020B0609020204030204" pitchFamily="49" charset="0"/>
+              </a:rPr>
+              <a:t>HIST 109</a:t>
+            </a:r>
+          </a:p>
+          <a:p>
+            <a:pPr algn="ctr"/>
+            <a:r>
+              <a:rPr lang="en-US" dirty="0">
+                <a:solidFill>
+                  <a:schemeClr val="tx1"/>
+                </a:solidFill>
+                <a:latin typeface="Consolas" panose="020B0609020204030204" pitchFamily="49" charset="0"/>
+                <a:cs typeface="Consolas" panose="020B0609020204030204" pitchFamily="49" charset="0"/>
+              </a:rPr>
+              <a:t>AY 2024</a:t>
+            </a:r>
+          </a:p>
+          <a:p>
+            <a:pPr algn="ctr"/>
+            <a:r>
+              <a:rPr lang="en-US" dirty="0">
+                <a:solidFill>
+                  <a:schemeClr val="tx1"/>
+                </a:solidFill>
+                <a:latin typeface="Consolas" panose="020B0609020204030204" pitchFamily="49" charset="0"/>
+                <a:cs typeface="Consolas" panose="020B0609020204030204" pitchFamily="49" charset="0"/>
+              </a:rPr>
+              <a:t>ID = 932</a:t>
+            </a:r>
+          </a:p>
+        </p:txBody>
+      </p:sp>
+      <p:sp>
+        <p:nvSpPr>
+          <p:cNvPr id="6" name="Rounded Rectangle 5">
+            <a:extLst>
+              <a:ext uri="{FF2B5EF4-FFF2-40B4-BE49-F238E27FC236}">
+                <a16:creationId xmlns:a16="http://schemas.microsoft.com/office/drawing/2014/main" id="{071FC65A-724E-326A-C9D0-2E7FB34F1DB8}"/>
+              </a:ext>
+            </a:extLst>
+          </p:cNvPr>
+          <p:cNvSpPr/>
+          <p:nvPr/>
+        </p:nvSpPr>
+        <p:spPr>
+          <a:xfrm>
+            <a:off x="2993926" y="1240993"/>
+            <a:ext cx="1966003" cy="1210962"/>
+          </a:xfrm>
+          <a:prstGeom prst="roundRect">
+            <a:avLst/>
+          </a:prstGeom>
+          <a:solidFill>
+            <a:schemeClr val="bg1">
+              <a:lumMod val="75000"/>
+            </a:schemeClr>
+          </a:solidFill>
+        </p:spPr>
+        <p:style>
+          <a:lnRef idx="2">
+            <a:schemeClr val="accent1">
+              <a:shade val="15000"/>
+            </a:schemeClr>
+          </a:lnRef>
+          <a:fillRef idx="1">
+            <a:schemeClr val="accent1"/>
+          </a:fillRef>
+          <a:effectRef idx="0">
+            <a:schemeClr val="accent1"/>
+          </a:effectRef>
+          <a:fontRef idx="minor">
+            <a:schemeClr val="lt1"/>
+          </a:fontRef>
+        </p:style>
+        <p:txBody>
+          <a:bodyPr rtlCol="0" anchor="ctr"/>
+          <a:lstStyle/>
+          <a:p>
+            <a:pPr algn="ctr"/>
+            <a:r>
+              <a:rPr lang="en-US" dirty="0">
+                <a:solidFill>
+                  <a:schemeClr val="tx1"/>
+                </a:solidFill>
+                <a:latin typeface="Consolas" panose="020B0609020204030204" pitchFamily="49" charset="0"/>
+                <a:cs typeface="Consolas" panose="020B0609020204030204" pitchFamily="49" charset="0"/>
+              </a:rPr>
+              <a:t>Stem 8923 </a:t>
+            </a:r>
+          </a:p>
+        </p:txBody>
+      </p:sp>
+      <p:cxnSp>
+        <p:nvCxnSpPr>
+          <p:cNvPr id="8" name="Straight Arrow Connector 7">
+            <a:extLst>
+              <a:ext uri="{FF2B5EF4-FFF2-40B4-BE49-F238E27FC236}">
+                <a16:creationId xmlns:a16="http://schemas.microsoft.com/office/drawing/2014/main" id="{4798AD2E-1234-37A8-B815-ECFEFBD804C9}"/>
+              </a:ext>
+            </a:extLst>
+          </p:cNvPr>
+          <p:cNvCxnSpPr>
+            <a:cxnSpLocks/>
+            <a:stCxn id="4" idx="0"/>
+            <a:endCxn id="6" idx="3"/>
+          </p:cNvCxnSpPr>
+          <p:nvPr/>
+        </p:nvCxnSpPr>
+        <p:spPr>
+          <a:xfrm flipH="1" flipV="1">
+            <a:off x="4959929" y="1846474"/>
+            <a:ext cx="923496" cy="1582526"/>
+          </a:xfrm>
+          <a:prstGeom prst="straightConnector1">
+            <a:avLst/>
+          </a:prstGeom>
+          <a:ln w="38100">
+            <a:solidFill>
+              <a:schemeClr val="tx1"/>
+            </a:solidFill>
+            <a:tailEnd type="triangle"/>
+          </a:ln>
+        </p:spPr>
+        <p:style>
+          <a:lnRef idx="2">
+            <a:schemeClr val="accent1"/>
+          </a:lnRef>
+          <a:fillRef idx="0">
+            <a:schemeClr val="accent1"/>
+          </a:fillRef>
+          <a:effectRef idx="1">
+            <a:schemeClr val="accent1"/>
+          </a:effectRef>
+          <a:fontRef idx="minor">
+            <a:schemeClr val="tx1"/>
+          </a:fontRef>
+        </p:style>
+      </p:cxnSp>
+      <p:cxnSp>
+        <p:nvCxnSpPr>
+          <p:cNvPr id="9" name="Straight Arrow Connector 8">
+            <a:extLst>
+              <a:ext uri="{FF2B5EF4-FFF2-40B4-BE49-F238E27FC236}">
+                <a16:creationId xmlns:a16="http://schemas.microsoft.com/office/drawing/2014/main" id="{0A390F77-A3C8-E9E2-4F15-B326188665DA}"/>
+              </a:ext>
+            </a:extLst>
+          </p:cNvPr>
+          <p:cNvCxnSpPr>
+            <a:cxnSpLocks/>
+            <a:stCxn id="5" idx="0"/>
+            <a:endCxn id="6" idx="1"/>
+          </p:cNvCxnSpPr>
+          <p:nvPr/>
+        </p:nvCxnSpPr>
+        <p:spPr>
+          <a:xfrm flipV="1">
+            <a:off x="2010925" y="1846474"/>
+            <a:ext cx="983001" cy="1582526"/>
+          </a:xfrm>
+          <a:prstGeom prst="straightConnector1">
+            <a:avLst/>
+          </a:prstGeom>
+          <a:ln w="38100">
+            <a:solidFill>
+              <a:schemeClr val="tx1"/>
+            </a:solidFill>
+            <a:tailEnd type="triangle"/>
+          </a:ln>
+        </p:spPr>
+        <p:style>
+          <a:lnRef idx="2">
+            <a:schemeClr val="accent1"/>
+          </a:lnRef>
+          <a:fillRef idx="0">
+            <a:schemeClr val="accent1"/>
+          </a:fillRef>
+          <a:effectRef idx="1">
+            <a:schemeClr val="accent1"/>
+          </a:effectRef>
+          <a:fontRef idx="minor">
+            <a:schemeClr val="tx1"/>
+          </a:fontRef>
+        </p:style>
+      </p:cxnSp>
+    </p:spTree>
+    <p:extLst>
+      <p:ext uri="{BB962C8B-B14F-4D97-AF65-F5344CB8AC3E}">
+        <p14:creationId xmlns:p14="http://schemas.microsoft.com/office/powerpoint/2010/main" val="3998763628"/>
       </p:ext>
     </p:extLst>
   </p:cSld>

</xml_diff>